<commit_message>
final commit - slides and pdf
</commit_message>
<xml_diff>
--- a/diplomski.pptx
+++ b/diplomski.pptx
@@ -5,7 +5,7 @@
     <p:sldMasterId id="2147483648" r:id="rId1"/>
   </p:sldMasterIdLst>
   <p:notesMasterIdLst>
-    <p:notesMasterId r:id="rId41"/>
+    <p:notesMasterId r:id="rId42"/>
   </p:notesMasterIdLst>
   <p:sldIdLst>
     <p:sldId id="256" r:id="rId2"/>
@@ -46,7 +46,8 @@
     <p:sldId id="297" r:id="rId37"/>
     <p:sldId id="298" r:id="rId38"/>
     <p:sldId id="299" r:id="rId39"/>
-    <p:sldId id="300" r:id="rId40"/>
+    <p:sldId id="301" r:id="rId40"/>
+    <p:sldId id="300" r:id="rId41"/>
   </p:sldIdLst>
   <p:sldSz cx="12192000" cy="6858000"/>
   <p:notesSz cx="6858000" cy="9144000"/>
@@ -235,7 +236,7 @@
           <a:p>
             <a:fld id="{50E69A02-FC72-4EB7-83A9-C9644DE4A576}" type="datetimeFigureOut">
               <a:rPr lang="en-US" smtClean="0"/>
-              <a:t>7/9/2024</a:t>
+              <a:t>7/10/2024</a:t>
             </a:fld>
             <a:endParaRPr lang="en-US"/>
           </a:p>
@@ -651,7 +652,7 @@
           <a:p>
             <a:fld id="{AF6DF2BE-7EC9-4D46-953C-2A4ADD839DFF}" type="datetime1">
               <a:rPr lang="hr-HR" smtClean="0"/>
-              <a:t>9.7.2024.</a:t>
+              <a:t>10.7.2024.</a:t>
             </a:fld>
             <a:endParaRPr lang="hr-HR"/>
           </a:p>
@@ -822,7 +823,7 @@
           <a:p>
             <a:fld id="{C3622449-9376-4BE7-A311-32FC8C2ADEEE}" type="datetime1">
               <a:rPr lang="hr-HR" smtClean="0"/>
-              <a:t>9.7.2024.</a:t>
+              <a:t>10.7.2024.</a:t>
             </a:fld>
             <a:endParaRPr lang="hr-HR"/>
           </a:p>
@@ -1032,7 +1033,7 @@
           <a:p>
             <a:fld id="{7BED3E13-476D-4E7B-ABCA-CF36F4AF57E9}" type="datetime1">
               <a:rPr lang="hr-HR" smtClean="0"/>
-              <a:t>9.7.2024.</a:t>
+              <a:t>10.7.2024.</a:t>
             </a:fld>
             <a:endParaRPr lang="hr-HR"/>
           </a:p>
@@ -1232,7 +1233,7 @@
           <a:p>
             <a:fld id="{DFE1F9B3-D0ED-4682-8085-89DD90D43449}" type="datetime1">
               <a:rPr lang="hr-HR" smtClean="0"/>
-              <a:t>9.7.2024.</a:t>
+              <a:t>10.7.2024.</a:t>
             </a:fld>
             <a:endParaRPr lang="hr-HR"/>
           </a:p>
@@ -1513,7 +1514,7 @@
           <a:p>
             <a:fld id="{7CC14FE8-80F0-49C2-A5EF-09869C89D8CC}" type="datetime1">
               <a:rPr lang="hr-HR" smtClean="0"/>
-              <a:t>9.7.2024.</a:t>
+              <a:t>10.7.2024.</a:t>
             </a:fld>
             <a:endParaRPr lang="hr-HR"/>
           </a:p>
@@ -1752,7 +1753,7 @@
           <a:p>
             <a:fld id="{E2E54037-A0F3-4445-99BF-729D8DD20FD7}" type="datetime1">
               <a:rPr lang="hr-HR" smtClean="0"/>
-              <a:t>9.7.2024.</a:t>
+              <a:t>10.7.2024.</a:t>
             </a:fld>
             <a:endParaRPr lang="hr-HR"/>
           </a:p>
@@ -2167,7 +2168,7 @@
           <a:p>
             <a:fld id="{0440F32A-52A8-43A7-9239-5B83353B12F8}" type="datetime1">
               <a:rPr lang="hr-HR" smtClean="0"/>
-              <a:t>9.7.2024.</a:t>
+              <a:t>10.7.2024.</a:t>
             </a:fld>
             <a:endParaRPr lang="hr-HR"/>
           </a:p>
@@ -2309,7 +2310,7 @@
           <a:p>
             <a:fld id="{8D76A2C5-1F34-4D5F-B865-4C6C2556B1D2}" type="datetime1">
               <a:rPr lang="hr-HR" smtClean="0"/>
-              <a:t>9.7.2024.</a:t>
+              <a:t>10.7.2024.</a:t>
             </a:fld>
             <a:endParaRPr lang="hr-HR"/>
           </a:p>
@@ -2422,7 +2423,7 @@
           <a:p>
             <a:fld id="{6F23D22B-847F-4B9E-875C-E337130A124F}" type="datetime1">
               <a:rPr lang="hr-HR" smtClean="0"/>
-              <a:t>9.7.2024.</a:t>
+              <a:t>10.7.2024.</a:t>
             </a:fld>
             <a:endParaRPr lang="hr-HR"/>
           </a:p>
@@ -2735,7 +2736,7 @@
           <a:p>
             <a:fld id="{AFF63897-EF14-4187-9019-101FA91E8EA7}" type="datetime1">
               <a:rPr lang="hr-HR" smtClean="0"/>
-              <a:t>9.7.2024.</a:t>
+              <a:t>10.7.2024.</a:t>
             </a:fld>
             <a:endParaRPr lang="hr-HR"/>
           </a:p>
@@ -3024,7 +3025,7 @@
           <a:p>
             <a:fld id="{7F6E90B9-482E-4490-86A2-7889925689CF}" type="datetime1">
               <a:rPr lang="hr-HR" smtClean="0"/>
-              <a:t>9.7.2024.</a:t>
+              <a:t>10.7.2024.</a:t>
             </a:fld>
             <a:endParaRPr lang="hr-HR"/>
           </a:p>
@@ -3267,7 +3268,7 @@
           <a:p>
             <a:fld id="{8F982036-4D9A-4234-9E94-8B93530E810F}" type="datetime1">
               <a:rPr lang="hr-HR" smtClean="0"/>
-              <a:t>9.7.2024.</a:t>
+              <a:t>10.7.2024.</a:t>
             </a:fld>
             <a:endParaRPr lang="hr-HR"/>
           </a:p>
@@ -4282,6 +4283,323 @@
           </a:prstGeom>
         </p:spPr>
       </p:pic>
+      <p:cxnSp>
+        <p:nvCxnSpPr>
+          <p:cNvPr id="13" name="Straight Arrow Connector 12">
+            <a:extLst>
+              <a:ext uri="{FF2B5EF4-FFF2-40B4-BE49-F238E27FC236}">
+                <a16:creationId xmlns:a16="http://schemas.microsoft.com/office/drawing/2014/main" id="{84F03502-CC99-B88F-60EE-157CB223B4D3}"/>
+              </a:ext>
+            </a:extLst>
+          </p:cNvPr>
+          <p:cNvCxnSpPr/>
+          <p:nvPr/>
+        </p:nvCxnSpPr>
+        <p:spPr>
+          <a:xfrm>
+            <a:off x="5441133" y="4608214"/>
+            <a:ext cx="0" cy="787651"/>
+          </a:xfrm>
+          <a:prstGeom prst="straightConnector1">
+            <a:avLst/>
+          </a:prstGeom>
+          <a:ln>
+            <a:solidFill>
+              <a:schemeClr val="tx1"/>
+            </a:solidFill>
+            <a:tailEnd type="triangle"/>
+          </a:ln>
+        </p:spPr>
+        <p:style>
+          <a:lnRef idx="2">
+            <a:schemeClr val="accent1"/>
+          </a:lnRef>
+          <a:fillRef idx="0">
+            <a:schemeClr val="accent1"/>
+          </a:fillRef>
+          <a:effectRef idx="1">
+            <a:schemeClr val="accent1"/>
+          </a:effectRef>
+          <a:fontRef idx="minor">
+            <a:schemeClr val="tx1"/>
+          </a:fontRef>
+        </p:style>
+      </p:cxnSp>
+      <p:cxnSp>
+        <p:nvCxnSpPr>
+          <p:cNvPr id="14" name="Straight Arrow Connector 13">
+            <a:extLst>
+              <a:ext uri="{FF2B5EF4-FFF2-40B4-BE49-F238E27FC236}">
+                <a16:creationId xmlns:a16="http://schemas.microsoft.com/office/drawing/2014/main" id="{FB2F0B67-521A-40BB-4F3C-83CE662EA3B9}"/>
+              </a:ext>
+            </a:extLst>
+          </p:cNvPr>
+          <p:cNvCxnSpPr>
+            <a:cxnSpLocks/>
+            <a:endCxn id="21" idx="0"/>
+          </p:cNvCxnSpPr>
+          <p:nvPr/>
+        </p:nvCxnSpPr>
+        <p:spPr>
+          <a:xfrm flipH="1">
+            <a:off x="6315612" y="4608214"/>
+            <a:ext cx="599727" cy="1141211"/>
+          </a:xfrm>
+          <a:prstGeom prst="straightConnector1">
+            <a:avLst/>
+          </a:prstGeom>
+          <a:ln>
+            <a:solidFill>
+              <a:schemeClr val="tx1"/>
+            </a:solidFill>
+            <a:tailEnd type="triangle"/>
+          </a:ln>
+        </p:spPr>
+        <p:style>
+          <a:lnRef idx="2">
+            <a:schemeClr val="accent1"/>
+          </a:lnRef>
+          <a:fillRef idx="0">
+            <a:schemeClr val="accent1"/>
+          </a:fillRef>
+          <a:effectRef idx="1">
+            <a:schemeClr val="accent1"/>
+          </a:effectRef>
+          <a:fontRef idx="minor">
+            <a:schemeClr val="tx1"/>
+          </a:fontRef>
+        </p:style>
+      </p:cxnSp>
+      <p:cxnSp>
+        <p:nvCxnSpPr>
+          <p:cNvPr id="15" name="Straight Arrow Connector 14">
+            <a:extLst>
+              <a:ext uri="{FF2B5EF4-FFF2-40B4-BE49-F238E27FC236}">
+                <a16:creationId xmlns:a16="http://schemas.microsoft.com/office/drawing/2014/main" id="{861557DB-3B30-9776-3B91-EA2CCFF0CA7F}"/>
+              </a:ext>
+            </a:extLst>
+          </p:cNvPr>
+          <p:cNvCxnSpPr>
+            <a:cxnSpLocks/>
+          </p:cNvCxnSpPr>
+          <p:nvPr/>
+        </p:nvCxnSpPr>
+        <p:spPr>
+          <a:xfrm flipV="1">
+            <a:off x="7275969" y="3739081"/>
+            <a:ext cx="0" cy="340166"/>
+          </a:xfrm>
+          <a:prstGeom prst="straightConnector1">
+            <a:avLst/>
+          </a:prstGeom>
+          <a:ln>
+            <a:solidFill>
+              <a:schemeClr val="tx1"/>
+            </a:solidFill>
+            <a:tailEnd type="triangle"/>
+          </a:ln>
+        </p:spPr>
+        <p:style>
+          <a:lnRef idx="2">
+            <a:schemeClr val="accent1"/>
+          </a:lnRef>
+          <a:fillRef idx="0">
+            <a:schemeClr val="accent1"/>
+          </a:fillRef>
+          <a:effectRef idx="1">
+            <a:schemeClr val="accent1"/>
+          </a:effectRef>
+          <a:fontRef idx="minor">
+            <a:schemeClr val="tx1"/>
+          </a:fontRef>
+        </p:style>
+      </p:cxnSp>
+      <p:cxnSp>
+        <p:nvCxnSpPr>
+          <p:cNvPr id="17" name="Straight Arrow Connector 16">
+            <a:extLst>
+              <a:ext uri="{FF2B5EF4-FFF2-40B4-BE49-F238E27FC236}">
+                <a16:creationId xmlns:a16="http://schemas.microsoft.com/office/drawing/2014/main" id="{8599A9D0-B4D5-F7F2-C769-01B9FA5D32D3}"/>
+              </a:ext>
+            </a:extLst>
+          </p:cNvPr>
+          <p:cNvCxnSpPr/>
+          <p:nvPr/>
+        </p:nvCxnSpPr>
+        <p:spPr>
+          <a:xfrm>
+            <a:off x="7710535" y="4608214"/>
+            <a:ext cx="0" cy="787651"/>
+          </a:xfrm>
+          <a:prstGeom prst="straightConnector1">
+            <a:avLst/>
+          </a:prstGeom>
+          <a:ln>
+            <a:solidFill>
+              <a:schemeClr val="tx1"/>
+            </a:solidFill>
+            <a:tailEnd type="triangle"/>
+          </a:ln>
+        </p:spPr>
+        <p:style>
+          <a:lnRef idx="2">
+            <a:schemeClr val="accent1"/>
+          </a:lnRef>
+          <a:fillRef idx="0">
+            <a:schemeClr val="accent1"/>
+          </a:fillRef>
+          <a:effectRef idx="1">
+            <a:schemeClr val="accent1"/>
+          </a:effectRef>
+          <a:fontRef idx="minor">
+            <a:schemeClr val="tx1"/>
+          </a:fontRef>
+        </p:style>
+      </p:cxnSp>
+      <p:sp>
+        <p:nvSpPr>
+          <p:cNvPr id="19" name="TextBox 18">
+            <a:extLst>
+              <a:ext uri="{FF2B5EF4-FFF2-40B4-BE49-F238E27FC236}">
+                <a16:creationId xmlns:a16="http://schemas.microsoft.com/office/drawing/2014/main" id="{62AE266E-96A4-BBDF-A832-1A86567E5E71}"/>
+              </a:ext>
+            </a:extLst>
+          </p:cNvPr>
+          <p:cNvSpPr txBox="1"/>
+          <p:nvPr/>
+        </p:nvSpPr>
+        <p:spPr>
+          <a:xfrm>
+            <a:off x="6470951" y="3388656"/>
+            <a:ext cx="1735027" cy="369332"/>
+          </a:xfrm>
+          <a:prstGeom prst="rect">
+            <a:avLst/>
+          </a:prstGeom>
+          <a:noFill/>
+        </p:spPr>
+        <p:txBody>
+          <a:bodyPr wrap="none" rtlCol="0">
+            <a:spAutoFit/>
+          </a:bodyPr>
+          <a:lstStyle/>
+          <a:p>
+            <a:r>
+              <a:rPr lang="hr-HR" dirty="0"/>
+              <a:t>hiperparametar</a:t>
+            </a:r>
+            <a:endParaRPr lang="en-US" dirty="0"/>
+          </a:p>
+        </p:txBody>
+      </p:sp>
+      <p:sp>
+        <p:nvSpPr>
+          <p:cNvPr id="20" name="TextBox 19">
+            <a:extLst>
+              <a:ext uri="{FF2B5EF4-FFF2-40B4-BE49-F238E27FC236}">
+                <a16:creationId xmlns:a16="http://schemas.microsoft.com/office/drawing/2014/main" id="{AC3A5F61-66AC-D774-D800-F2A49993FB48}"/>
+              </a:ext>
+            </a:extLst>
+          </p:cNvPr>
+          <p:cNvSpPr txBox="1"/>
+          <p:nvPr/>
+        </p:nvSpPr>
+        <p:spPr>
+          <a:xfrm>
+            <a:off x="3975799" y="5336087"/>
+            <a:ext cx="1735027" cy="369332"/>
+          </a:xfrm>
+          <a:prstGeom prst="rect">
+            <a:avLst/>
+          </a:prstGeom>
+          <a:noFill/>
+        </p:spPr>
+        <p:txBody>
+          <a:bodyPr wrap="none" rtlCol="0">
+            <a:spAutoFit/>
+          </a:bodyPr>
+          <a:lstStyle/>
+          <a:p>
+            <a:r>
+              <a:rPr lang="hr-HR" dirty="0"/>
+              <a:t>hiperparametar</a:t>
+            </a:r>
+            <a:endParaRPr lang="en-US" dirty="0"/>
+          </a:p>
+        </p:txBody>
+      </p:sp>
+      <p:sp>
+        <p:nvSpPr>
+          <p:cNvPr id="21" name="TextBox 20">
+            <a:extLst>
+              <a:ext uri="{FF2B5EF4-FFF2-40B4-BE49-F238E27FC236}">
+                <a16:creationId xmlns:a16="http://schemas.microsoft.com/office/drawing/2014/main" id="{82C54E92-8C2E-5496-A6A4-BB53A0C90A0A}"/>
+              </a:ext>
+            </a:extLst>
+          </p:cNvPr>
+          <p:cNvSpPr txBox="1"/>
+          <p:nvPr/>
+        </p:nvSpPr>
+        <p:spPr>
+          <a:xfrm>
+            <a:off x="5526485" y="5749425"/>
+            <a:ext cx="1578253" cy="369332"/>
+          </a:xfrm>
+          <a:prstGeom prst="rect">
+            <a:avLst/>
+          </a:prstGeom>
+          <a:noFill/>
+        </p:spPr>
+        <p:txBody>
+          <a:bodyPr wrap="none" rtlCol="0">
+            <a:spAutoFit/>
+          </a:bodyPr>
+          <a:lstStyle/>
+          <a:p>
+            <a:r>
+              <a:rPr lang="hr-HR" dirty="0"/>
+              <a:t>indeks stupca</a:t>
+            </a:r>
+            <a:endParaRPr lang="en-US" dirty="0"/>
+          </a:p>
+        </p:txBody>
+      </p:sp>
+      <p:sp>
+        <p:nvSpPr>
+          <p:cNvPr id="23" name="TextBox 22">
+            <a:extLst>
+              <a:ext uri="{FF2B5EF4-FFF2-40B4-BE49-F238E27FC236}">
+                <a16:creationId xmlns:a16="http://schemas.microsoft.com/office/drawing/2014/main" id="{238F6B8B-E98D-9335-8E0B-DB60616AF039}"/>
+              </a:ext>
+            </a:extLst>
+          </p:cNvPr>
+          <p:cNvSpPr txBox="1"/>
+          <p:nvPr/>
+        </p:nvSpPr>
+        <p:spPr>
+          <a:xfrm>
+            <a:off x="6948231" y="5358090"/>
+            <a:ext cx="1427570" cy="369332"/>
+          </a:xfrm>
+          <a:prstGeom prst="rect">
+            <a:avLst/>
+          </a:prstGeom>
+          <a:noFill/>
+        </p:spPr>
+        <p:txBody>
+          <a:bodyPr wrap="none" rtlCol="0">
+            <a:spAutoFit/>
+          </a:bodyPr>
+          <a:lstStyle/>
+          <a:p>
+            <a:r>
+              <a:rPr lang="hr-HR" dirty="0"/>
+              <a:t>broj stupaca</a:t>
+            </a:r>
+            <a:endParaRPr lang="en-US" dirty="0"/>
+          </a:p>
+        </p:txBody>
+      </p:sp>
     </p:spTree>
     <p:extLst>
       <p:ext uri="{BB962C8B-B14F-4D97-AF65-F5344CB8AC3E}">
@@ -12314,12 +12632,41 @@
           </a:p>
         </p:txBody>
       </p:sp>
+      <p:sp>
+        <p:nvSpPr>
+          <p:cNvPr id="8" name="Slide Number Placeholder 7">
+            <a:extLst>
+              <a:ext uri="{FF2B5EF4-FFF2-40B4-BE49-F238E27FC236}">
+                <a16:creationId xmlns:a16="http://schemas.microsoft.com/office/drawing/2014/main" id="{1E251783-564A-EB28-E96F-F70E0937952F}"/>
+              </a:ext>
+            </a:extLst>
+          </p:cNvPr>
+          <p:cNvSpPr>
+            <a:spLocks noGrp="1"/>
+          </p:cNvSpPr>
+          <p:nvPr>
+            <p:ph type="sldNum" sz="quarter" idx="12"/>
+          </p:nvPr>
+        </p:nvSpPr>
+        <p:spPr/>
+        <p:txBody>
+          <a:bodyPr/>
+          <a:lstStyle/>
+          <a:p>
+            <a:fld id="{4486782D-0C7A-4B53-AF12-1BF30B981283}" type="slidenum">
+              <a:rPr lang="hr-HR" smtClean="0"/>
+              <a:t>34</a:t>
+            </a:fld>
+            <a:endParaRPr lang="hr-HR"/>
+          </a:p>
+        </p:txBody>
+      </p:sp>
       <p:pic>
         <p:nvPicPr>
-          <p:cNvPr id="7" name="Picture 6">
-            <a:extLst>
-              <a:ext uri="{FF2B5EF4-FFF2-40B4-BE49-F238E27FC236}">
-                <a16:creationId xmlns:a16="http://schemas.microsoft.com/office/drawing/2014/main" id="{F480A3DB-8E55-48A3-4561-922D1596BF12}"/>
+          <p:cNvPr id="4" name="Picture 3">
+            <a:extLst>
+              <a:ext uri="{FF2B5EF4-FFF2-40B4-BE49-F238E27FC236}">
+                <a16:creationId xmlns:a16="http://schemas.microsoft.com/office/drawing/2014/main" id="{8F9338CA-A261-57D6-1D0B-EAA17CC1D8D3}"/>
               </a:ext>
             </a:extLst>
           </p:cNvPr>
@@ -12336,43 +12683,14 @@
         </p:blipFill>
         <p:spPr>
           <a:xfrm>
-            <a:off x="1781387" y="1510881"/>
-            <a:ext cx="8358678" cy="4981994"/>
+            <a:off x="0" y="2004092"/>
+            <a:ext cx="12192000" cy="3754980"/>
           </a:xfrm>
           <a:prstGeom prst="rect">
             <a:avLst/>
           </a:prstGeom>
         </p:spPr>
       </p:pic>
-      <p:sp>
-        <p:nvSpPr>
-          <p:cNvPr id="8" name="Slide Number Placeholder 7">
-            <a:extLst>
-              <a:ext uri="{FF2B5EF4-FFF2-40B4-BE49-F238E27FC236}">
-                <a16:creationId xmlns:a16="http://schemas.microsoft.com/office/drawing/2014/main" id="{1E251783-564A-EB28-E96F-F70E0937952F}"/>
-              </a:ext>
-            </a:extLst>
-          </p:cNvPr>
-          <p:cNvSpPr>
-            <a:spLocks noGrp="1"/>
-          </p:cNvSpPr>
-          <p:nvPr>
-            <p:ph type="sldNum" sz="quarter" idx="12"/>
-          </p:nvPr>
-        </p:nvSpPr>
-        <p:spPr/>
-        <p:txBody>
-          <a:bodyPr/>
-          <a:lstStyle/>
-          <a:p>
-            <a:fld id="{4486782D-0C7A-4B53-AF12-1BF30B981283}" type="slidenum">
-              <a:rPr lang="hr-HR" smtClean="0"/>
-              <a:t>34</a:t>
-            </a:fld>
-            <a:endParaRPr lang="hr-HR"/>
-          </a:p>
-        </p:txBody>
-      </p:sp>
     </p:spTree>
     <p:extLst>
       <p:ext uri="{BB962C8B-B14F-4D97-AF65-F5344CB8AC3E}">
@@ -12953,20 +13271,10 @@
             </a:r>
           </a:p>
           <a:p>
+            <a:pPr marL="0" indent="0">
+              <a:buNone/>
+            </a:pPr>
             <a:endParaRPr lang="hr-HR" dirty="0"/>
-          </a:p>
-          <a:p>
-            <a:r>
-              <a:rPr lang="hr-HR" dirty="0"/>
-              <a:t>Iako u potpunosti uklonimo sve napade, u procesu izgubimo oko 25% čistih primjera, što nam narušava točnost modela</a:t>
-            </a:r>
-          </a:p>
-          <a:p>
-            <a:r>
-              <a:rPr lang="hr-HR" dirty="0"/>
-              <a:t>Za budući rad – poboljšati naučene reprezentacije?</a:t>
-            </a:r>
-            <a:endParaRPr lang="en-US" dirty="0"/>
           </a:p>
         </p:txBody>
       </p:sp>
@@ -13009,116 +13317,6 @@
   <p:clrMapOvr>
     <a:masterClrMapping/>
   </p:clrMapOvr>
-  <p:timing>
-    <p:tnLst>
-      <p:par>
-        <p:cTn id="1" dur="indefinite" restart="never" nodeType="tmRoot">
-          <p:childTnLst>
-            <p:seq concurrent="1" nextAc="seek">
-              <p:cTn id="2" dur="indefinite" nodeType="mainSeq">
-                <p:childTnLst>
-                  <p:par>
-                    <p:cTn id="3" fill="hold">
-                      <p:stCondLst>
-                        <p:cond delay="indefinite"/>
-                      </p:stCondLst>
-                      <p:childTnLst>
-                        <p:par>
-                          <p:cTn id="4" fill="hold">
-                            <p:stCondLst>
-                              <p:cond delay="0"/>
-                            </p:stCondLst>
-                            <p:childTnLst>
-                              <p:par>
-                                <p:cTn id="5" presetID="1" presetClass="entr" presetSubtype="0" fill="hold" nodeType="clickEffect">
-                                  <p:stCondLst>
-                                    <p:cond delay="0"/>
-                                  </p:stCondLst>
-                                  <p:childTnLst>
-                                    <p:set>
-                                      <p:cBhvr>
-                                        <p:cTn id="6" dur="1" fill="hold">
-                                          <p:stCondLst>
-                                            <p:cond delay="0"/>
-                                          </p:stCondLst>
-                                        </p:cTn>
-                                        <p:tgtEl>
-                                          <p:spTgt spid="3">
-                                            <p:txEl>
-                                              <p:pRg st="5" end="5"/>
-                                            </p:txEl>
-                                          </p:spTgt>
-                                        </p:tgtEl>
-                                        <p:attrNameLst>
-                                          <p:attrName>style.visibility</p:attrName>
-                                        </p:attrNameLst>
-                                      </p:cBhvr>
-                                      <p:to>
-                                        <p:strVal val="visible"/>
-                                      </p:to>
-                                    </p:set>
-                                  </p:childTnLst>
-                                </p:cTn>
-                              </p:par>
-                              <p:par>
-                                <p:cTn id="7" presetID="1" presetClass="entr" presetSubtype="0" fill="hold" nodeType="withEffect">
-                                  <p:stCondLst>
-                                    <p:cond delay="0"/>
-                                  </p:stCondLst>
-                                  <p:childTnLst>
-                                    <p:set>
-                                      <p:cBhvr>
-                                        <p:cTn id="8" dur="1" fill="hold">
-                                          <p:stCondLst>
-                                            <p:cond delay="0"/>
-                                          </p:stCondLst>
-                                        </p:cTn>
-                                        <p:tgtEl>
-                                          <p:spTgt spid="3">
-                                            <p:txEl>
-                                              <p:pRg st="6" end="6"/>
-                                            </p:txEl>
-                                          </p:spTgt>
-                                        </p:tgtEl>
-                                        <p:attrNameLst>
-                                          <p:attrName>style.visibility</p:attrName>
-                                        </p:attrNameLst>
-                                      </p:cBhvr>
-                                      <p:to>
-                                        <p:strVal val="visible"/>
-                                      </p:to>
-                                    </p:set>
-                                  </p:childTnLst>
-                                </p:cTn>
-                              </p:par>
-                            </p:childTnLst>
-                          </p:cTn>
-                        </p:par>
-                      </p:childTnLst>
-                    </p:cTn>
-                  </p:par>
-                </p:childTnLst>
-              </p:cTn>
-              <p:prevCondLst>
-                <p:cond evt="onPrev" delay="0">
-                  <p:tgtEl>
-                    <p:sldTgt/>
-                  </p:tgtEl>
-                </p:cond>
-              </p:prevCondLst>
-              <p:nextCondLst>
-                <p:cond evt="onNext" delay="0">
-                  <p:tgtEl>
-                    <p:sldTgt/>
-                  </p:tgtEl>
-                </p:cond>
-              </p:nextCondLst>
-            </p:seq>
-          </p:childTnLst>
-        </p:cTn>
-      </p:par>
-    </p:tnLst>
-  </p:timing>
 </p:sld>
 </file>
 
@@ -13141,10 +13339,10 @@
       </p:grpSpPr>
       <p:sp>
         <p:nvSpPr>
-          <p:cNvPr id="5" name="Title 4">
-            <a:extLst>
-              <a:ext uri="{FF2B5EF4-FFF2-40B4-BE49-F238E27FC236}">
-                <a16:creationId xmlns:a16="http://schemas.microsoft.com/office/drawing/2014/main" id="{B064DBE1-7B47-2B48-49D5-B8D3A9735C54}"/>
+          <p:cNvPr id="2" name="Title 1">
+            <a:extLst>
+              <a:ext uri="{FF2B5EF4-FFF2-40B4-BE49-F238E27FC236}">
+                <a16:creationId xmlns:a16="http://schemas.microsoft.com/office/drawing/2014/main" id="{B9F4CFF9-DE73-D431-9F2D-51DF2E94B38B}"/>
               </a:ext>
             </a:extLst>
           </p:cNvPr>
@@ -13162,7 +13360,7 @@
           <a:p>
             <a:r>
               <a:rPr lang="hr-HR" dirty="0"/>
-              <a:t>Hvala!</a:t>
+              <a:t>Zaključak</a:t>
             </a:r>
             <a:endParaRPr lang="en-US" dirty="0"/>
           </a:p>
@@ -13170,26 +13368,78 @@
       </p:sp>
       <p:sp>
         <p:nvSpPr>
-          <p:cNvPr id="6" name="Text Placeholder 5">
-            <a:extLst>
-              <a:ext uri="{FF2B5EF4-FFF2-40B4-BE49-F238E27FC236}">
-                <a16:creationId xmlns:a16="http://schemas.microsoft.com/office/drawing/2014/main" id="{D7DB179C-D4B7-BDE0-1AD0-5FD736B03844}"/>
-              </a:ext>
-            </a:extLst>
-          </p:cNvPr>
-          <p:cNvSpPr>
-            <a:spLocks noGrp="1"/>
-          </p:cNvSpPr>
-          <p:nvPr>
-            <p:ph type="body" idx="1"/>
+          <p:cNvPr id="3" name="Content Placeholder 2">
+            <a:extLst>
+              <a:ext uri="{FF2B5EF4-FFF2-40B4-BE49-F238E27FC236}">
+                <a16:creationId xmlns:a16="http://schemas.microsoft.com/office/drawing/2014/main" id="{E0D12C69-1811-FA56-718F-3413BAB776ED}"/>
+              </a:ext>
+            </a:extLst>
+          </p:cNvPr>
+          <p:cNvSpPr>
+            <a:spLocks noGrp="1"/>
+          </p:cNvSpPr>
+          <p:nvPr>
+            <p:ph idx="1"/>
           </p:nvPr>
         </p:nvSpPr>
         <p:spPr/>
         <p:txBody>
-          <a:bodyPr/>
-          <a:lstStyle/>
-          <a:p>
-            <a:endParaRPr lang="en-US"/>
+          <a:bodyPr>
+            <a:normAutofit/>
+          </a:bodyPr>
+          <a:lstStyle/>
+          <a:p>
+            <a:r>
+              <a:rPr lang="hr-HR" dirty="0"/>
+              <a:t>Iako u potpunosti uklonimo sve napade, u procesu izgubimo oko 25% čistih primjera, što nam narušava točnost modela</a:t>
+            </a:r>
+          </a:p>
+          <a:p>
+            <a:r>
+              <a:rPr lang="hr-HR" dirty="0"/>
+              <a:t>Za budući rad – poboljšati naučene reprezentacije?</a:t>
+            </a:r>
+          </a:p>
+          <a:p>
+            <a:pPr lvl="1"/>
+            <a:r>
+              <a:rPr lang="hr-HR" dirty="0"/>
+              <a:t>Drukčiji samonadzirani modeli</a:t>
+            </a:r>
+          </a:p>
+          <a:p>
+            <a:pPr lvl="1"/>
+            <a:r>
+              <a:rPr lang="hr-HR" dirty="0"/>
+              <a:t>Dublja okosnica</a:t>
+            </a:r>
+          </a:p>
+          <a:p>
+            <a:pPr lvl="1"/>
+            <a:r>
+              <a:rPr lang="hr-HR" dirty="0"/>
+              <a:t>Više epoha</a:t>
+            </a:r>
+          </a:p>
+          <a:p>
+            <a:r>
+              <a:rPr lang="hr-HR" dirty="0"/>
+              <a:t>Umjesto odbacivanja najmanje grupe, promatrati SIG napad kao problem stršećih vrijednosti</a:t>
+            </a:r>
+          </a:p>
+          <a:p>
+            <a:pPr lvl="1"/>
+            <a:r>
+              <a:rPr lang="hr-HR" dirty="0"/>
+              <a:t>Iskoristit neki postojeći algoritam poput RANSAC-a</a:t>
+            </a:r>
+          </a:p>
+          <a:p>
+            <a:pPr lvl="1"/>
+            <a:endParaRPr lang="en-US" dirty="0"/>
+          </a:p>
+          <a:p>
+            <a:endParaRPr lang="hr-HR" dirty="0"/>
           </a:p>
         </p:txBody>
       </p:sp>
@@ -13198,30 +13448,24 @@
           <p:cNvPr id="4" name="Slide Number Placeholder 3">
             <a:extLst>
               <a:ext uri="{FF2B5EF4-FFF2-40B4-BE49-F238E27FC236}">
-                <a16:creationId xmlns:a16="http://schemas.microsoft.com/office/drawing/2014/main" id="{71FC207B-4B2A-1982-48EA-481C606C1248}"/>
-              </a:ext>
-            </a:extLst>
-          </p:cNvPr>
-          <p:cNvSpPr>
-            <a:spLocks noGrp="1"/>
-          </p:cNvSpPr>
-          <p:nvPr>
-            <p:ph type="sldNum" sz="quarter" idx="4294967295"/>
-          </p:nvPr>
-        </p:nvSpPr>
-        <p:spPr>
-          <a:xfrm>
-            <a:off x="9448800" y="6356350"/>
-            <a:ext cx="2743200" cy="365125"/>
-          </a:xfrm>
-        </p:spPr>
+                <a16:creationId xmlns:a16="http://schemas.microsoft.com/office/drawing/2014/main" id="{0C5E2C25-1E0D-DB84-4BBC-E69CA8444B3B}"/>
+              </a:ext>
+            </a:extLst>
+          </p:cNvPr>
+          <p:cNvSpPr>
+            <a:spLocks noGrp="1"/>
+          </p:cNvSpPr>
+          <p:nvPr>
+            <p:ph type="sldNum" sz="quarter" idx="12"/>
+          </p:nvPr>
+        </p:nvSpPr>
+        <p:spPr/>
         <p:txBody>
           <a:bodyPr/>
           <a:lstStyle/>
           <a:p>
             <a:fld id="{4486782D-0C7A-4B53-AF12-1BF30B981283}" type="slidenum">
               <a:rPr lang="hr-HR" smtClean="0"/>
-              <a:pPr/>
               <a:t>39</a:t>
             </a:fld>
             <a:endParaRPr lang="hr-HR"/>
@@ -13231,7 +13475,7 @@
     </p:spTree>
     <p:extLst>
       <p:ext uri="{BB962C8B-B14F-4D97-AF65-F5344CB8AC3E}">
-        <p14:creationId xmlns:p14="http://schemas.microsoft.com/office/powerpoint/2010/main" val="1344660784"/>
+        <p14:creationId xmlns:p14="http://schemas.microsoft.com/office/powerpoint/2010/main" val="2081997642"/>
       </p:ext>
     </p:extLst>
   </p:cSld>
@@ -13349,6 +13593,125 @@
     <p:extLst>
       <p:ext uri="{BB962C8B-B14F-4D97-AF65-F5344CB8AC3E}">
         <p14:creationId xmlns:p14="http://schemas.microsoft.com/office/powerpoint/2010/main" val="3906426846"/>
+      </p:ext>
+    </p:extLst>
+  </p:cSld>
+  <p:clrMapOvr>
+    <a:masterClrMapping/>
+  </p:clrMapOvr>
+</p:sld>
+</file>
+
+<file path=ppt/slides/slide40.xml><?xml version="1.0" encoding="utf-8"?>
+<p:sld xmlns:a="http://schemas.openxmlformats.org/drawingml/2006/main" xmlns:r="http://schemas.openxmlformats.org/officeDocument/2006/relationships" xmlns:p="http://schemas.openxmlformats.org/presentationml/2006/main">
+  <p:cSld>
+    <p:spTree>
+      <p:nvGrpSpPr>
+        <p:cNvPr id="1" name=""/>
+        <p:cNvGrpSpPr/>
+        <p:nvPr/>
+      </p:nvGrpSpPr>
+      <p:grpSpPr>
+        <a:xfrm>
+          <a:off x="0" y="0"/>
+          <a:ext cx="0" cy="0"/>
+          <a:chOff x="0" y="0"/>
+          <a:chExt cx="0" cy="0"/>
+        </a:xfrm>
+      </p:grpSpPr>
+      <p:sp>
+        <p:nvSpPr>
+          <p:cNvPr id="5" name="Title 4">
+            <a:extLst>
+              <a:ext uri="{FF2B5EF4-FFF2-40B4-BE49-F238E27FC236}">
+                <a16:creationId xmlns:a16="http://schemas.microsoft.com/office/drawing/2014/main" id="{B064DBE1-7B47-2B48-49D5-B8D3A9735C54}"/>
+              </a:ext>
+            </a:extLst>
+          </p:cNvPr>
+          <p:cNvSpPr>
+            <a:spLocks noGrp="1"/>
+          </p:cNvSpPr>
+          <p:nvPr>
+            <p:ph type="title"/>
+          </p:nvPr>
+        </p:nvSpPr>
+        <p:spPr/>
+        <p:txBody>
+          <a:bodyPr/>
+          <a:lstStyle/>
+          <a:p>
+            <a:r>
+              <a:rPr lang="hr-HR" dirty="0"/>
+              <a:t>Hvala!</a:t>
+            </a:r>
+            <a:endParaRPr lang="en-US" dirty="0"/>
+          </a:p>
+        </p:txBody>
+      </p:sp>
+      <p:sp>
+        <p:nvSpPr>
+          <p:cNvPr id="6" name="Text Placeholder 5">
+            <a:extLst>
+              <a:ext uri="{FF2B5EF4-FFF2-40B4-BE49-F238E27FC236}">
+                <a16:creationId xmlns:a16="http://schemas.microsoft.com/office/drawing/2014/main" id="{D7DB179C-D4B7-BDE0-1AD0-5FD736B03844}"/>
+              </a:ext>
+            </a:extLst>
+          </p:cNvPr>
+          <p:cNvSpPr>
+            <a:spLocks noGrp="1"/>
+          </p:cNvSpPr>
+          <p:nvPr>
+            <p:ph type="body" idx="1"/>
+          </p:nvPr>
+        </p:nvSpPr>
+        <p:spPr/>
+        <p:txBody>
+          <a:bodyPr/>
+          <a:lstStyle/>
+          <a:p>
+            <a:endParaRPr lang="en-US"/>
+          </a:p>
+        </p:txBody>
+      </p:sp>
+      <p:sp>
+        <p:nvSpPr>
+          <p:cNvPr id="4" name="Slide Number Placeholder 3">
+            <a:extLst>
+              <a:ext uri="{FF2B5EF4-FFF2-40B4-BE49-F238E27FC236}">
+                <a16:creationId xmlns:a16="http://schemas.microsoft.com/office/drawing/2014/main" id="{71FC207B-4B2A-1982-48EA-481C606C1248}"/>
+              </a:ext>
+            </a:extLst>
+          </p:cNvPr>
+          <p:cNvSpPr>
+            <a:spLocks noGrp="1"/>
+          </p:cNvSpPr>
+          <p:nvPr>
+            <p:ph type="sldNum" sz="quarter" idx="4294967295"/>
+          </p:nvPr>
+        </p:nvSpPr>
+        <p:spPr>
+          <a:xfrm>
+            <a:off x="9448800" y="6356350"/>
+            <a:ext cx="2743200" cy="365125"/>
+          </a:xfrm>
+        </p:spPr>
+        <p:txBody>
+          <a:bodyPr/>
+          <a:lstStyle/>
+          <a:p>
+            <a:fld id="{4486782D-0C7A-4B53-AF12-1BF30B981283}" type="slidenum">
+              <a:rPr lang="hr-HR" smtClean="0"/>
+              <a:pPr/>
+              <a:t>40</a:t>
+            </a:fld>
+            <a:endParaRPr lang="hr-HR"/>
+          </a:p>
+        </p:txBody>
+      </p:sp>
+    </p:spTree>
+    <p:extLst>
+      <p:ext uri="{BB962C8B-B14F-4D97-AF65-F5344CB8AC3E}">
+        <p14:creationId xmlns:p14="http://schemas.microsoft.com/office/powerpoint/2010/main" val="1344660784"/>
       </p:ext>
     </p:extLst>
   </p:cSld>

</xml_diff>